<commit_message>
ppt wk3， ready for submission for wk3 dropbox, content: Draft presentation (picture of team, names, client, project name).
</commit_message>
<xml_diff>
--- a/week3-public-submission/Team 11_Draft PowerPoint Slides.pptx
+++ b/week3-public-submission/Team 11_Draft PowerPoint Slides.pptx
@@ -5,13 +5,15 @@
     <p:sldMasterId id="2147483648" r:id="rId1"/>
   </p:sldMasterIdLst>
   <p:sldIdLst>
-    <p:sldId id="290" r:id="rId3"/>
-    <p:sldId id="289" r:id="rId4"/>
+    <p:sldId id="294" r:id="rId3"/>
+    <p:sldId id="290" r:id="rId4"/>
+    <p:sldId id="293" r:id="rId5"/>
+    <p:sldId id="289" r:id="rId6"/>
   </p:sldIdLst>
   <p:sldSz cx="9144000" cy="6858000"/>
   <p:notesSz cx="9144000" cy="6858000"/>
   <p:custDataLst>
-    <p:tags r:id="rId8"/>
+    <p:tags r:id="rId10"/>
   </p:custDataLst>
   <p:defaultTextStyle>
     <a:defPPr>
@@ -1852,9 +1854,102 @@
           </a:p>
         </p:txBody>
       </p:sp>
+      <p:sp>
+        <p:nvSpPr>
+          <p:cNvPr id="8" name="文本框 7"/>
+          <p:cNvSpPr txBox="1"/>
+          <p:nvPr/>
+        </p:nvSpPr>
+        <p:spPr>
+          <a:xfrm>
+            <a:off x="5257800" y="2971800"/>
+            <a:ext cx="4044315" cy="645160"/>
+          </a:xfrm>
+          <a:prstGeom prst="rect">
+            <a:avLst/>
+          </a:prstGeom>
+          <a:noFill/>
+        </p:spPr>
+        <p:txBody>
+          <a:bodyPr wrap="square" rtlCol="0">
+            <a:spAutoFit/>
+          </a:bodyPr>
+          <a:p>
+            <a:r>
+              <a:rPr lang="en-US" altLang="zh-CN"/>
+              <a:t>Team member: </a:t>
+            </a:r>
+            <a:endParaRPr lang="en-US" altLang="zh-CN"/>
+          </a:p>
+          <a:p>
+            <a:r>
+              <a:rPr lang="en-US" altLang="zh-CN"/>
+              <a:t>Bin Hu</a:t>
+            </a:r>
+            <a:endParaRPr lang="en-US" altLang="zh-CN"/>
+          </a:p>
+        </p:txBody>
+      </p:sp>
+      <p:sp>
+        <p:nvSpPr>
+          <p:cNvPr id="9" name="文本框 8"/>
+          <p:cNvSpPr txBox="1"/>
+          <p:nvPr/>
+        </p:nvSpPr>
+        <p:spPr>
+          <a:xfrm>
+            <a:off x="5257800" y="3847465"/>
+            <a:ext cx="4044315" cy="1725930"/>
+          </a:xfrm>
+          <a:prstGeom prst="rect">
+            <a:avLst/>
+          </a:prstGeom>
+          <a:noFill/>
+        </p:spPr>
+        <p:txBody>
+          <a:bodyPr wrap="square" rtlCol="0">
+            <a:noAutofit/>
+          </a:bodyPr>
+          <a:p>
+            <a:r>
+              <a:rPr lang="en-US" altLang="zh-CN"/>
+              <a:t>Responsibility: </a:t>
+            </a:r>
+            <a:endParaRPr lang="en-US" altLang="zh-CN"/>
+          </a:p>
+          <a:p>
+            <a:r>
+              <a:rPr lang="en-US" altLang="zh-CN"/>
+              <a:t>Teamlead,</a:t>
+            </a:r>
+            <a:endParaRPr lang="en-US" altLang="zh-CN"/>
+          </a:p>
+          <a:p>
+            <a:r>
+              <a:rPr lang="en-US" altLang="zh-CN"/>
+              <a:t>Dev,</a:t>
+            </a:r>
+            <a:endParaRPr lang="en-US" altLang="zh-CN"/>
+          </a:p>
+          <a:p>
+            <a:r>
+              <a:rPr lang="en-US" altLang="zh-CN"/>
+              <a:t>Client communication,</a:t>
+            </a:r>
+            <a:endParaRPr lang="en-US" altLang="zh-CN"/>
+          </a:p>
+          <a:p>
+            <a:r>
+              <a:rPr lang="en-US" altLang="zh-CN"/>
+              <a:t>Github Management</a:t>
+            </a:r>
+            <a:endParaRPr lang="en-US" altLang="zh-CN"/>
+          </a:p>
+        </p:txBody>
+      </p:sp>
       <p:pic>
         <p:nvPicPr>
-          <p:cNvPr id="7" name="图片 6" descr="teams"/>
+          <p:cNvPr id="5" name="图片 4" descr="SMARS"/>
           <p:cNvPicPr>
             <a:picLocks noChangeAspect="1"/>
           </p:cNvPicPr>
@@ -1868,93 +1963,14 @@
         </p:blipFill>
         <p:spPr>
           <a:xfrm>
-            <a:off x="152400" y="2895600"/>
-            <a:ext cx="4210050" cy="2838450"/>
+            <a:off x="533400" y="2819400"/>
+            <a:ext cx="3964305" cy="2977515"/>
           </a:xfrm>
           <a:prstGeom prst="rect">
             <a:avLst/>
           </a:prstGeom>
         </p:spPr>
       </p:pic>
-      <p:sp>
-        <p:nvSpPr>
-          <p:cNvPr id="8" name="文本框 7"/>
-          <p:cNvSpPr txBox="1"/>
-          <p:nvPr/>
-        </p:nvSpPr>
-        <p:spPr>
-          <a:xfrm>
-            <a:off x="4876800" y="2971800"/>
-            <a:ext cx="4044315" cy="645160"/>
-          </a:xfrm>
-          <a:prstGeom prst="rect">
-            <a:avLst/>
-          </a:prstGeom>
-          <a:noFill/>
-        </p:spPr>
-        <p:txBody>
-          <a:bodyPr wrap="square" rtlCol="0">
-            <a:spAutoFit/>
-          </a:bodyPr>
-          <a:p>
-            <a:r>
-              <a:rPr lang="en-US" altLang="zh-CN"/>
-              <a:t>Team member: </a:t>
-            </a:r>
-            <a:endParaRPr lang="en-US" altLang="zh-CN"/>
-          </a:p>
-          <a:p>
-            <a:r>
-              <a:rPr lang="en-US" altLang="zh-CN"/>
-              <a:t>Bin Hu, Chia-Hua Chang, Zhiqun Xie</a:t>
-            </a:r>
-            <a:endParaRPr lang="en-US" altLang="zh-CN"/>
-          </a:p>
-        </p:txBody>
-      </p:sp>
-      <p:sp>
-        <p:nvSpPr>
-          <p:cNvPr id="9" name="文本框 8"/>
-          <p:cNvSpPr txBox="1"/>
-          <p:nvPr/>
-        </p:nvSpPr>
-        <p:spPr>
-          <a:xfrm>
-            <a:off x="4899025" y="4343400"/>
-            <a:ext cx="4044315" cy="922020"/>
-          </a:xfrm>
-          <a:prstGeom prst="rect">
-            <a:avLst/>
-          </a:prstGeom>
-          <a:noFill/>
-        </p:spPr>
-        <p:txBody>
-          <a:bodyPr wrap="square" rtlCol="0">
-            <a:spAutoFit/>
-          </a:bodyPr>
-          <a:p>
-            <a:r>
-              <a:rPr lang="en-US" altLang="zh-CN"/>
-              <a:t>Client company: </a:t>
-            </a:r>
-            <a:endParaRPr lang="en-US" altLang="zh-CN"/>
-          </a:p>
-          <a:p>
-            <a:r>
-              <a:rPr lang="en-US" altLang="zh-CN"/>
-              <a:t>Conestoga Provincial Park</a:t>
-            </a:r>
-            <a:endParaRPr lang="en-US" altLang="zh-CN"/>
-          </a:p>
-          <a:p>
-            <a:r>
-              <a:rPr lang="en-US" altLang="zh-CN"/>
-              <a:t>P.I.C: Thomas Hanks </a:t>
-            </a:r>
-            <a:endParaRPr lang="en-US" altLang="zh-CN"/>
-          </a:p>
-        </p:txBody>
-      </p:sp>
     </p:spTree>
   </p:cSld>
   <p:clrMapOvr>
@@ -1992,7 +2008,386 @@
         </p:nvSpPr>
         <p:spPr>
           <a:xfrm>
-            <a:off x="3623309" y="3249549"/>
+            <a:off x="856894" y="1289050"/>
+            <a:ext cx="7433309" cy="1367155"/>
+          </a:xfrm>
+          <a:prstGeom prst="rect">
+            <a:avLst/>
+          </a:prstGeom>
+        </p:spPr>
+        <p:txBody>
+          <a:bodyPr vert="horz" wrap="square" lIns="0" tIns="13335" rIns="0" bIns="0" rtlCol="0">
+            <a:spAutoFit/>
+          </a:bodyPr>
+          <a:lstStyle/>
+          <a:p>
+            <a:pPr marL="266700">
+              <a:lnSpc>
+                <a:spcPct val="100000"/>
+              </a:lnSpc>
+              <a:spcBef>
+                <a:spcPts val="105"/>
+              </a:spcBef>
+            </a:pPr>
+            <a:r>
+              <a:rPr lang="en-US" sz="4400" spc="-30" dirty="0"/>
+              <a:t>Conestoga Provincial Park</a:t>
+            </a:r>
+            <a:br>
+              <a:rPr lang="en-US" sz="4400" spc="-30" dirty="0"/>
+            </a:br>
+            <a:r>
+              <a:rPr lang="en-US" sz="4400" spc="-30" dirty="0"/>
+              <a:t>Online Reservation System</a:t>
+            </a:r>
+            <a:endParaRPr lang="en-US" sz="4400" spc="-30" dirty="0"/>
+          </a:p>
+        </p:txBody>
+      </p:sp>
+      <p:sp>
+        <p:nvSpPr>
+          <p:cNvPr id="8" name="文本框 7"/>
+          <p:cNvSpPr txBox="1"/>
+          <p:nvPr/>
+        </p:nvSpPr>
+        <p:spPr>
+          <a:xfrm>
+            <a:off x="4876800" y="2971800"/>
+            <a:ext cx="4044315" cy="645160"/>
+          </a:xfrm>
+          <a:prstGeom prst="rect">
+            <a:avLst/>
+          </a:prstGeom>
+          <a:noFill/>
+        </p:spPr>
+        <p:txBody>
+          <a:bodyPr wrap="square" rtlCol="0">
+            <a:spAutoFit/>
+          </a:bodyPr>
+          <a:p>
+            <a:r>
+              <a:rPr lang="en-US" altLang="zh-CN"/>
+              <a:t>Team member: </a:t>
+            </a:r>
+            <a:endParaRPr lang="en-US" altLang="zh-CN"/>
+          </a:p>
+          <a:p>
+            <a:r>
+              <a:rPr lang="en-US" altLang="zh-CN"/>
+              <a:t>Chia-Hua Chang</a:t>
+            </a:r>
+            <a:endParaRPr lang="en-US" altLang="zh-CN"/>
+          </a:p>
+        </p:txBody>
+      </p:sp>
+      <p:pic>
+        <p:nvPicPr>
+          <p:cNvPr id="3" name="图片 2" descr="嘉华"/>
+          <p:cNvPicPr>
+            <a:picLocks noChangeAspect="1"/>
+          </p:cNvPicPr>
+          <p:nvPr/>
+        </p:nvPicPr>
+        <p:blipFill>
+          <a:blip r:embed="rId1"/>
+          <a:stretch>
+            <a:fillRect/>
+          </a:stretch>
+        </p:blipFill>
+        <p:spPr>
+          <a:xfrm>
+            <a:off x="1219200" y="2819400"/>
+            <a:ext cx="2343785" cy="3121025"/>
+          </a:xfrm>
+          <a:prstGeom prst="rect">
+            <a:avLst/>
+          </a:prstGeom>
+        </p:spPr>
+      </p:pic>
+      <p:sp>
+        <p:nvSpPr>
+          <p:cNvPr id="6" name="文本框 5"/>
+          <p:cNvSpPr txBox="1"/>
+          <p:nvPr/>
+        </p:nvSpPr>
+        <p:spPr>
+          <a:xfrm>
+            <a:off x="4876800" y="3847465"/>
+            <a:ext cx="4044315" cy="1725930"/>
+          </a:xfrm>
+          <a:prstGeom prst="rect">
+            <a:avLst/>
+          </a:prstGeom>
+          <a:noFill/>
+        </p:spPr>
+        <p:txBody>
+          <a:bodyPr wrap="square" rtlCol="0">
+            <a:noAutofit/>
+          </a:bodyPr>
+          <a:p>
+            <a:r>
+              <a:rPr lang="en-US" altLang="zh-CN"/>
+              <a:t>Responsibility: </a:t>
+            </a:r>
+            <a:endParaRPr lang="en-US" altLang="zh-CN"/>
+          </a:p>
+          <a:p>
+            <a:r>
+              <a:rPr lang="en-US" altLang="zh-CN"/>
+              <a:t>Project cloud deployment,</a:t>
+            </a:r>
+            <a:endParaRPr lang="en-US" altLang="zh-CN"/>
+          </a:p>
+          <a:p>
+            <a:r>
+              <a:rPr lang="en-US" altLang="zh-CN"/>
+              <a:t>Meeting munites and documentation,</a:t>
+            </a:r>
+            <a:endParaRPr lang="en-US" altLang="zh-CN"/>
+          </a:p>
+          <a:p>
+            <a:r>
+              <a:rPr lang="en-US" altLang="zh-CN"/>
+              <a:t>Jira management,</a:t>
+            </a:r>
+            <a:endParaRPr lang="en-US" altLang="zh-CN"/>
+          </a:p>
+          <a:p>
+            <a:r>
+              <a:rPr lang="en-US" altLang="zh-CN"/>
+              <a:t>Scrum master </a:t>
+            </a:r>
+            <a:endParaRPr lang="en-US" altLang="zh-CN"/>
+          </a:p>
+        </p:txBody>
+      </p:sp>
+    </p:spTree>
+  </p:cSld>
+  <p:clrMapOvr>
+    <a:masterClrMapping/>
+  </p:clrMapOvr>
+</p:sld>
+</file>
+
+<file path=ppt/slides/slide3.xml><?xml version="1.0" encoding="utf-8"?>
+<p:sld xmlns:a="http://schemas.openxmlformats.org/drawingml/2006/main" xmlns:r="http://schemas.openxmlformats.org/officeDocument/2006/relationships" xmlns:p="http://schemas.openxmlformats.org/presentationml/2006/main">
+  <p:cSld>
+    <p:spTree>
+      <p:nvGrpSpPr>
+        <p:cNvPr id="1" name=""/>
+        <p:cNvGrpSpPr/>
+        <p:nvPr/>
+      </p:nvGrpSpPr>
+      <p:grpSpPr>
+        <a:xfrm>
+          <a:off x="0" y="0"/>
+          <a:ext cx="0" cy="0"/>
+          <a:chOff x="0" y="0"/>
+          <a:chExt cx="0" cy="0"/>
+        </a:xfrm>
+      </p:grpSpPr>
+      <p:sp>
+        <p:nvSpPr>
+          <p:cNvPr id="2" name="object 2"/>
+          <p:cNvSpPr txBox="1">
+            <a:spLocks noGrp="1"/>
+          </p:cNvSpPr>
+          <p:nvPr>
+            <p:ph type="title"/>
+          </p:nvPr>
+        </p:nvSpPr>
+        <p:spPr>
+          <a:xfrm>
+            <a:off x="856894" y="1289050"/>
+            <a:ext cx="7433309" cy="1367155"/>
+          </a:xfrm>
+          <a:prstGeom prst="rect">
+            <a:avLst/>
+          </a:prstGeom>
+        </p:spPr>
+        <p:txBody>
+          <a:bodyPr vert="horz" wrap="square" lIns="0" tIns="13335" rIns="0" bIns="0" rtlCol="0">
+            <a:spAutoFit/>
+          </a:bodyPr>
+          <a:lstStyle/>
+          <a:p>
+            <a:pPr marL="266700">
+              <a:lnSpc>
+                <a:spcPct val="100000"/>
+              </a:lnSpc>
+              <a:spcBef>
+                <a:spcPts val="105"/>
+              </a:spcBef>
+            </a:pPr>
+            <a:r>
+              <a:rPr lang="en-US" sz="4400" spc="-30" dirty="0"/>
+              <a:t>Conestoga Provincial Park</a:t>
+            </a:r>
+            <a:br>
+              <a:rPr lang="en-US" sz="4400" spc="-30" dirty="0"/>
+            </a:br>
+            <a:r>
+              <a:rPr lang="en-US" sz="4400" spc="-30" dirty="0"/>
+              <a:t>Online Reservation System</a:t>
+            </a:r>
+            <a:endParaRPr lang="en-US" sz="4400" spc="-30" dirty="0"/>
+          </a:p>
+        </p:txBody>
+      </p:sp>
+      <p:sp>
+        <p:nvSpPr>
+          <p:cNvPr id="8" name="文本框 7"/>
+          <p:cNvSpPr txBox="1"/>
+          <p:nvPr/>
+        </p:nvSpPr>
+        <p:spPr>
+          <a:xfrm>
+            <a:off x="4876800" y="2971800"/>
+            <a:ext cx="4044315" cy="645160"/>
+          </a:xfrm>
+          <a:prstGeom prst="rect">
+            <a:avLst/>
+          </a:prstGeom>
+          <a:noFill/>
+        </p:spPr>
+        <p:txBody>
+          <a:bodyPr wrap="square" rtlCol="0">
+            <a:spAutoFit/>
+          </a:bodyPr>
+          <a:p>
+            <a:r>
+              <a:rPr lang="en-US" altLang="zh-CN"/>
+              <a:t>Team member: </a:t>
+            </a:r>
+            <a:endParaRPr lang="en-US" altLang="zh-CN"/>
+          </a:p>
+          <a:p>
+            <a:r>
+              <a:rPr lang="en-US" altLang="zh-CN"/>
+              <a:t>Zhiqun Xie</a:t>
+            </a:r>
+            <a:endParaRPr lang="en-US" altLang="zh-CN"/>
+          </a:p>
+        </p:txBody>
+      </p:sp>
+      <p:pic>
+        <p:nvPicPr>
+          <p:cNvPr id="4" name="图片 3" descr="zhiqun"/>
+          <p:cNvPicPr>
+            <a:picLocks noChangeAspect="1"/>
+          </p:cNvPicPr>
+          <p:nvPr/>
+        </p:nvPicPr>
+        <p:blipFill>
+          <a:blip r:embed="rId1"/>
+          <a:stretch>
+            <a:fillRect/>
+          </a:stretch>
+        </p:blipFill>
+        <p:spPr>
+          <a:xfrm>
+            <a:off x="1143000" y="2656205"/>
+            <a:ext cx="2903220" cy="3870325"/>
+          </a:xfrm>
+          <a:prstGeom prst="rect">
+            <a:avLst/>
+          </a:prstGeom>
+        </p:spPr>
+      </p:pic>
+      <p:sp>
+        <p:nvSpPr>
+          <p:cNvPr id="6" name="文本框 5"/>
+          <p:cNvSpPr txBox="1"/>
+          <p:nvPr/>
+        </p:nvSpPr>
+        <p:spPr>
+          <a:xfrm>
+            <a:off x="4876800" y="3847465"/>
+            <a:ext cx="4044315" cy="1725930"/>
+          </a:xfrm>
+          <a:prstGeom prst="rect">
+            <a:avLst/>
+          </a:prstGeom>
+          <a:noFill/>
+        </p:spPr>
+        <p:txBody>
+          <a:bodyPr wrap="square" rtlCol="0">
+            <a:noAutofit/>
+          </a:bodyPr>
+          <a:p>
+            <a:r>
+              <a:rPr lang="en-US" altLang="zh-CN"/>
+              <a:t>Responsibility: </a:t>
+            </a:r>
+            <a:endParaRPr lang="en-US" altLang="zh-CN"/>
+          </a:p>
+          <a:p>
+            <a:r>
+              <a:rPr lang="en-US" altLang="zh-CN"/>
+              <a:t>Dev,</a:t>
+            </a:r>
+            <a:endParaRPr lang="en-US" altLang="zh-CN"/>
+          </a:p>
+          <a:p>
+            <a:r>
+              <a:rPr lang="en-US" altLang="zh-CN"/>
+              <a:t>Powerpoint</a:t>
+            </a:r>
+            <a:r>
+              <a:rPr lang="zh-CN" altLang="en-US">
+                <a:ea typeface="宋体" panose="02010600030101010101" pitchFamily="2" charset="-122"/>
+              </a:rPr>
+              <a:t>，</a:t>
+            </a:r>
+            <a:endParaRPr lang="en-US" altLang="zh-CN"/>
+          </a:p>
+          <a:p>
+            <a:r>
+              <a:rPr lang="en-US" altLang="zh-CN"/>
+              <a:t>Support</a:t>
+            </a:r>
+            <a:endParaRPr lang="en-US" altLang="zh-CN"/>
+          </a:p>
+        </p:txBody>
+      </p:sp>
+    </p:spTree>
+  </p:cSld>
+  <p:clrMapOvr>
+    <a:masterClrMapping/>
+  </p:clrMapOvr>
+</p:sld>
+</file>
+
+<file path=ppt/slides/slide4.xml><?xml version="1.0" encoding="utf-8"?>
+<p:sld xmlns:a="http://schemas.openxmlformats.org/drawingml/2006/main" xmlns:r="http://schemas.openxmlformats.org/officeDocument/2006/relationships" xmlns:p="http://schemas.openxmlformats.org/presentationml/2006/main">
+  <p:cSld>
+    <p:spTree>
+      <p:nvGrpSpPr>
+        <p:cNvPr id="1" name=""/>
+        <p:cNvGrpSpPr/>
+        <p:nvPr/>
+      </p:nvGrpSpPr>
+      <p:grpSpPr>
+        <a:xfrm>
+          <a:off x="0" y="0"/>
+          <a:ext cx="0" cy="0"/>
+          <a:chOff x="0" y="0"/>
+          <a:chExt cx="0" cy="0"/>
+        </a:xfrm>
+      </p:grpSpPr>
+      <p:sp>
+        <p:nvSpPr>
+          <p:cNvPr id="2" name="object 2"/>
+          <p:cNvSpPr txBox="1">
+            <a:spLocks noGrp="1"/>
+          </p:cNvSpPr>
+          <p:nvPr>
+            <p:ph type="title"/>
+          </p:nvPr>
+        </p:nvSpPr>
+        <p:spPr>
+          <a:xfrm>
+            <a:off x="3623309" y="3962654"/>
             <a:ext cx="1894839" cy="513715"/>
           </a:xfrm>
           <a:prstGeom prst="rect">
@@ -2026,6 +2421,93 @@
               <a:t>you!</a:t>
             </a:r>
             <a:endParaRPr sz="3200"/>
+          </a:p>
+        </p:txBody>
+      </p:sp>
+      <p:sp>
+        <p:nvSpPr>
+          <p:cNvPr id="3" name="文本框 2"/>
+          <p:cNvSpPr txBox="1"/>
+          <p:nvPr/>
+        </p:nvSpPr>
+        <p:spPr>
+          <a:xfrm>
+            <a:off x="3048000" y="1721485"/>
+            <a:ext cx="4677410" cy="2077085"/>
+          </a:xfrm>
+          <a:prstGeom prst="rect">
+            <a:avLst/>
+          </a:prstGeom>
+          <a:noFill/>
+        </p:spPr>
+        <p:txBody>
+          <a:bodyPr wrap="square" rtlCol="0">
+            <a:noAutofit/>
+          </a:bodyPr>
+          <a:p>
+            <a:r>
+              <a:rPr lang="en-US" altLang="zh-CN"/>
+              <a:t>TO BE CONTINUED.</a:t>
+            </a:r>
+            <a:endParaRPr lang="en-US" altLang="zh-CN"/>
+          </a:p>
+          <a:p>
+            <a:pPr indent="457200"/>
+            <a:r>
+              <a:rPr lang="en-US" altLang="zh-CN"/>
+              <a:t>- subject to change</a:t>
+            </a:r>
+            <a:endParaRPr lang="en-US" altLang="zh-CN"/>
+          </a:p>
+          <a:p>
+            <a:endParaRPr lang="en-US" altLang="zh-CN"/>
+          </a:p>
+          <a:p>
+            <a:r>
+              <a:rPr lang="en-US" altLang="zh-CN"/>
+              <a:t>To add in future updates: </a:t>
+            </a:r>
+            <a:endParaRPr lang="en-US" altLang="zh-CN"/>
+          </a:p>
+          <a:p>
+            <a:pPr indent="457200"/>
+            <a:r>
+              <a:rPr lang="en-US" altLang="zh-CN"/>
+              <a:t>- biz purpose</a:t>
+            </a:r>
+            <a:endParaRPr lang="en-US" altLang="zh-CN"/>
+          </a:p>
+          <a:p>
+            <a:pPr indent="457200"/>
+            <a:r>
+              <a:rPr lang="en-US" altLang="zh-CN"/>
+              <a:t>- teck stack</a:t>
+            </a:r>
+            <a:endParaRPr lang="en-US" altLang="zh-CN"/>
+          </a:p>
+          <a:p>
+            <a:pPr indent="457200"/>
+            <a:r>
+              <a:rPr lang="en-US" altLang="zh-CN"/>
+              <a:t>- system design diagrams</a:t>
+            </a:r>
+            <a:endParaRPr lang="en-US" altLang="zh-CN"/>
+          </a:p>
+          <a:p>
+            <a:endParaRPr lang="en-US" altLang="zh-CN"/>
+          </a:p>
+          <a:p>
+            <a:pPr indent="457200"/>
+            <a:endParaRPr lang="en-US" altLang="zh-CN"/>
+          </a:p>
+          <a:p>
+            <a:endParaRPr lang="en-US" altLang="zh-CN"/>
+          </a:p>
+          <a:p>
+            <a:endParaRPr lang="en-US" altLang="zh-CN"/>
+          </a:p>
+          <a:p>
+            <a:endParaRPr lang="en-US" altLang="zh-CN"/>
           </a:p>
         </p:txBody>
       </p:sp>

</xml_diff>